<commit_message>
Added exercise set on Databases
Plus some minor updates to DB-related presentation, and first version of RelMod.
</commit_message>
<xml_diff>
--- a/Chap/DB/Presentations/DBIntro.pptx
+++ b/Chap/DB/Presentations/DBIntro.pptx
@@ -262,7 +262,7 @@
           <a:p>
             <a:fld id="{E15B7D8E-2A20-4C0E-991C-872DBB7459A8}" type="datetimeFigureOut">
               <a:rPr lang="da-DK" smtClean="0"/>
-              <a:t>03-09-2018</a:t>
+              <a:t>27-09-2018</a:t>
             </a:fld>
             <a:endParaRPr lang="da-DK"/>
           </a:p>
@@ -432,7 +432,7 @@
           <a:p>
             <a:fld id="{E15B7D8E-2A20-4C0E-991C-872DBB7459A8}" type="datetimeFigureOut">
               <a:rPr lang="da-DK" smtClean="0"/>
-              <a:t>03-09-2018</a:t>
+              <a:t>27-09-2018</a:t>
             </a:fld>
             <a:endParaRPr lang="da-DK"/>
           </a:p>
@@ -612,7 +612,7 @@
           <a:p>
             <a:fld id="{E15B7D8E-2A20-4C0E-991C-872DBB7459A8}" type="datetimeFigureOut">
               <a:rPr lang="da-DK" smtClean="0"/>
-              <a:t>03-09-2018</a:t>
+              <a:t>27-09-2018</a:t>
             </a:fld>
             <a:endParaRPr lang="da-DK"/>
           </a:p>
@@ -782,7 +782,7 @@
           <a:p>
             <a:fld id="{E15B7D8E-2A20-4C0E-991C-872DBB7459A8}" type="datetimeFigureOut">
               <a:rPr lang="da-DK" smtClean="0"/>
-              <a:t>03-09-2018</a:t>
+              <a:t>27-09-2018</a:t>
             </a:fld>
             <a:endParaRPr lang="da-DK"/>
           </a:p>
@@ -1028,7 +1028,7 @@
           <a:p>
             <a:fld id="{E15B7D8E-2A20-4C0E-991C-872DBB7459A8}" type="datetimeFigureOut">
               <a:rPr lang="da-DK" smtClean="0"/>
-              <a:t>03-09-2018</a:t>
+              <a:t>27-09-2018</a:t>
             </a:fld>
             <a:endParaRPr lang="da-DK"/>
           </a:p>
@@ -1260,7 +1260,7 @@
           <a:p>
             <a:fld id="{E15B7D8E-2A20-4C0E-991C-872DBB7459A8}" type="datetimeFigureOut">
               <a:rPr lang="da-DK" smtClean="0"/>
-              <a:t>03-09-2018</a:t>
+              <a:t>27-09-2018</a:t>
             </a:fld>
             <a:endParaRPr lang="da-DK"/>
           </a:p>
@@ -1627,7 +1627,7 @@
           <a:p>
             <a:fld id="{E15B7D8E-2A20-4C0E-991C-872DBB7459A8}" type="datetimeFigureOut">
               <a:rPr lang="da-DK" smtClean="0"/>
-              <a:t>03-09-2018</a:t>
+              <a:t>27-09-2018</a:t>
             </a:fld>
             <a:endParaRPr lang="da-DK"/>
           </a:p>
@@ -1745,7 +1745,7 @@
           <a:p>
             <a:fld id="{E15B7D8E-2A20-4C0E-991C-872DBB7459A8}" type="datetimeFigureOut">
               <a:rPr lang="da-DK" smtClean="0"/>
-              <a:t>03-09-2018</a:t>
+              <a:t>27-09-2018</a:t>
             </a:fld>
             <a:endParaRPr lang="da-DK"/>
           </a:p>
@@ -1840,7 +1840,7 @@
           <a:p>
             <a:fld id="{E15B7D8E-2A20-4C0E-991C-872DBB7459A8}" type="datetimeFigureOut">
               <a:rPr lang="da-DK" smtClean="0"/>
-              <a:t>03-09-2018</a:t>
+              <a:t>27-09-2018</a:t>
             </a:fld>
             <a:endParaRPr lang="da-DK"/>
           </a:p>
@@ -2117,7 +2117,7 @@
           <a:p>
             <a:fld id="{E15B7D8E-2A20-4C0E-991C-872DBB7459A8}" type="datetimeFigureOut">
               <a:rPr lang="da-DK" smtClean="0"/>
-              <a:t>03-09-2018</a:t>
+              <a:t>27-09-2018</a:t>
             </a:fld>
             <a:endParaRPr lang="da-DK"/>
           </a:p>
@@ -2370,7 +2370,7 @@
           <a:p>
             <a:fld id="{E15B7D8E-2A20-4C0E-991C-872DBB7459A8}" type="datetimeFigureOut">
               <a:rPr lang="da-DK" smtClean="0"/>
-              <a:t>03-09-2018</a:t>
+              <a:t>27-09-2018</a:t>
             </a:fld>
             <a:endParaRPr lang="da-DK"/>
           </a:p>
@@ -2583,7 +2583,7 @@
           <a:p>
             <a:fld id="{E15B7D8E-2A20-4C0E-991C-872DBB7459A8}" type="datetimeFigureOut">
               <a:rPr lang="da-DK" smtClean="0"/>
-              <a:t>03-09-2018</a:t>
+              <a:t>27-09-2018</a:t>
             </a:fld>
             <a:endParaRPr lang="da-DK"/>
           </a:p>
@@ -3094,15 +3094,7 @@
                   <a:srgbClr val="FF0000"/>
                 </a:solidFill>
               </a:rPr>
-              <a:t>D</a:t>
-            </a:r>
-            <a:r>
-              <a:rPr lang="da-DK" b="1" smtClean="0">
-                <a:solidFill>
-                  <a:srgbClr val="FF0000"/>
-                </a:solidFill>
-              </a:rPr>
-              <a:t>atabase Management System</a:t>
+              <a:t>Database Management System</a:t>
             </a:r>
             <a:r>
               <a:rPr lang="da-DK" b="1" smtClean="0"/>
@@ -3657,15 +3649,7 @@
                   <a:srgbClr val="FF0000"/>
                 </a:solidFill>
               </a:rPr>
-              <a:t>D</a:t>
-            </a:r>
-            <a:r>
-              <a:rPr lang="da-DK" b="1" smtClean="0">
-                <a:solidFill>
-                  <a:srgbClr val="FF0000"/>
-                </a:solidFill>
-              </a:rPr>
-              <a:t>atabase Application Program</a:t>
+              <a:t>Database Application Program</a:t>
             </a:r>
             <a:r>
               <a:rPr lang="da-DK" b="1" smtClean="0"/>
@@ -5468,13 +5452,13 @@
   <p:clrMapOvr>
     <a:masterClrMapping/>
   </p:clrMapOvr>
-  <mc:AlternateContent xmlns:mc="http://schemas.openxmlformats.org/markup-compatibility/2006">
-    <mc:Choice xmlns:p14="http://schemas.microsoft.com/office/powerpoint/2010/main" Requires="p14">
+  <mc:AlternateContent xmlns:mc="http://schemas.openxmlformats.org/markup-compatibility/2006" xmlns:p14="http://schemas.microsoft.com/office/powerpoint/2010/main">
+    <mc:Choice Requires="p14">
       <p:transition spd="med" p14:dur="700">
         <p:fade/>
       </p:transition>
     </mc:Choice>
-    <mc:Fallback>
+    <mc:Fallback xmlns="">
       <p:transition spd="med">
         <p:fade/>
       </p:transition>
@@ -6513,13 +6497,13 @@
   <p:clrMapOvr>
     <a:masterClrMapping/>
   </p:clrMapOvr>
-  <mc:AlternateContent xmlns:mc="http://schemas.openxmlformats.org/markup-compatibility/2006">
-    <mc:Choice xmlns:p14="http://schemas.microsoft.com/office/powerpoint/2010/main" Requires="p14">
+  <mc:AlternateContent xmlns:mc="http://schemas.openxmlformats.org/markup-compatibility/2006" xmlns:p14="http://schemas.microsoft.com/office/powerpoint/2010/main">
+    <mc:Choice Requires="p14">
       <p:transition spd="med" p14:dur="700">
         <p:fade/>
       </p:transition>
     </mc:Choice>
-    <mc:Fallback>
+    <mc:Fallback xmlns="">
       <p:transition spd="med">
         <p:fade/>
       </p:transition>
@@ -7152,13 +7136,13 @@
   <p:clrMapOvr>
     <a:masterClrMapping/>
   </p:clrMapOvr>
-  <mc:AlternateContent xmlns:mc="http://schemas.openxmlformats.org/markup-compatibility/2006">
-    <mc:Choice xmlns:p14="http://schemas.microsoft.com/office/powerpoint/2010/main" Requires="p14">
+  <mc:AlternateContent xmlns:mc="http://schemas.openxmlformats.org/markup-compatibility/2006" xmlns:p14="http://schemas.microsoft.com/office/powerpoint/2010/main">
+    <mc:Choice Requires="p14">
       <p:transition spd="med" p14:dur="700">
         <p:fade/>
       </p:transition>
     </mc:Choice>
-    <mc:Fallback>
+    <mc:Fallback xmlns="">
       <p:transition spd="med">
         <p:fade/>
       </p:transition>
@@ -8281,13 +8265,13 @@
   <p:clrMapOvr>
     <a:masterClrMapping/>
   </p:clrMapOvr>
-  <mc:AlternateContent xmlns:mc="http://schemas.openxmlformats.org/markup-compatibility/2006">
-    <mc:Choice xmlns:p14="http://schemas.microsoft.com/office/powerpoint/2010/main" Requires="p14">
+  <mc:AlternateContent xmlns:mc="http://schemas.openxmlformats.org/markup-compatibility/2006" xmlns:p14="http://schemas.microsoft.com/office/powerpoint/2010/main">
+    <mc:Choice Requires="p14">
       <p:transition spd="med" p14:dur="700">
         <p:fade/>
       </p:transition>
     </mc:Choice>
-    <mc:Fallback>
+    <mc:Fallback xmlns="">
       <p:transition spd="med">
         <p:fade/>
       </p:transition>
@@ -8394,7 +8378,11 @@
             <a:pPr lvl="1"/>
             <a:r>
               <a:rPr lang="da-DK" sz="2800" smtClean="0"/>
-              <a:t>Used by many users at the same time</a:t>
+              <a:t>Can be used </a:t>
+            </a:r>
+            <a:r>
+              <a:rPr lang="da-DK" sz="2800" smtClean="0"/>
+              <a:t>by many users at the same time</a:t>
             </a:r>
           </a:p>
           <a:p>
@@ -9630,13 +9618,13 @@
   <p:clrMapOvr>
     <a:masterClrMapping/>
   </p:clrMapOvr>
-  <mc:AlternateContent xmlns:mc="http://schemas.openxmlformats.org/markup-compatibility/2006">
-    <mc:Choice xmlns:p14="http://schemas.microsoft.com/office/powerpoint/2010/main" Requires="p14">
+  <mc:AlternateContent xmlns:mc="http://schemas.openxmlformats.org/markup-compatibility/2006" xmlns:p14="http://schemas.microsoft.com/office/powerpoint/2010/main">
+    <mc:Choice Requires="p14">
       <p:transition spd="med" p14:dur="700">
         <p:fade/>
       </p:transition>
     </mc:Choice>
-    <mc:Fallback>
+    <mc:Fallback xmlns="">
       <p:transition spd="med">
         <p:fade/>
       </p:transition>

</xml_diff>